<commit_message>
minor updates to defines and matching doc
</commit_message>
<xml_diff>
--- a/docs/SBN_Design.pptx
+++ b/docs/SBN_Design.pptx
@@ -589,7 +589,7 @@
               <ma14:placeholderFlag xmlns:ma14="http://schemas.microsoft.com/office/mac/drawingml/2011/main" val="1"/>
             </a:ext>
             <a:ext uri="{909E8E84-426E-40dd-AFC4-6F175D3DCCD1}">
-              <a14:hiddenFill xmlns:a14="http://schemas.microsoft.com/office/drawing/2010/main" xmlns="">
+              <a14:hiddenFill xmlns="" xmlns:a14="http://schemas.microsoft.com/office/drawing/2010/main">
                 <a:solidFill>
                   <a:srgbClr val="FFFFFF"/>
                 </a:solidFill>
@@ -941,14 +941,14 @@
           <a:ln/>
           <a:extLst>
             <a:ext uri="{909E8E84-426E-40dd-AFC4-6F175D3DCCD1}">
-              <a14:hiddenFill xmlns:a14="http://schemas.microsoft.com/office/drawing/2010/main" xmlns="">
+              <a14:hiddenFill xmlns="" xmlns:a14="http://schemas.microsoft.com/office/drawing/2010/main">
                 <a:solidFill>
                   <a:srgbClr val="FFFFFF"/>
                 </a:solidFill>
               </a14:hiddenFill>
             </a:ext>
             <a:ext uri="{91240B29-F687-4f45-9708-019B960494DF}">
-              <a14:hiddenLine xmlns:a14="http://schemas.microsoft.com/office/drawing/2010/main" xmlns="" w="9525">
+              <a14:hiddenLine xmlns="" xmlns:a14="http://schemas.microsoft.com/office/drawing/2010/main" w="9525">
                 <a:solidFill>
                   <a:srgbClr val="000000"/>
                 </a:solidFill>
@@ -1118,14 +1118,14 @@
               <ma14:placeholderFlag xmlns:ma14="http://schemas.microsoft.com/office/mac/drawingml/2011/main" val="1"/>
             </a:ext>
             <a:ext uri="{909E8E84-426E-40dd-AFC4-6F175D3DCCD1}">
-              <a14:hiddenFill xmlns:a14="http://schemas.microsoft.com/office/drawing/2010/main" xmlns="">
+              <a14:hiddenFill xmlns="" xmlns:a14="http://schemas.microsoft.com/office/drawing/2010/main">
                 <a:solidFill>
                   <a:srgbClr val="FFFFFF"/>
                 </a:solidFill>
               </a14:hiddenFill>
             </a:ext>
             <a:ext uri="{91240B29-F687-4f45-9708-019B960494DF}">
-              <a14:hiddenLine xmlns:a14="http://schemas.microsoft.com/office/drawing/2010/main" xmlns="" w="9525">
+              <a14:hiddenLine xmlns="" xmlns:a14="http://schemas.microsoft.com/office/drawing/2010/main" w="9525">
                 <a:solidFill>
                   <a:srgbClr val="000000"/>
                 </a:solidFill>
@@ -1195,14 +1195,14 @@
           </a:ln>
           <a:extLst>
             <a:ext uri="{909E8E84-426E-40dd-AFC4-6F175D3DCCD1}">
-              <a14:hiddenFill xmlns:a14="http://schemas.microsoft.com/office/drawing/2010/main" xmlns="">
+              <a14:hiddenFill xmlns="" xmlns:a14="http://schemas.microsoft.com/office/drawing/2010/main">
                 <a:solidFill>
                   <a:srgbClr val="FFFFFF"/>
                 </a:solidFill>
               </a14:hiddenFill>
             </a:ext>
             <a:ext uri="{91240B29-F687-4f45-9708-019B960494DF}">
-              <a14:hiddenLine xmlns:a14="http://schemas.microsoft.com/office/drawing/2010/main" xmlns="" w="9525">
+              <a14:hiddenLine xmlns="" xmlns:a14="http://schemas.microsoft.com/office/drawing/2010/main" w="9525">
                 <a:solidFill>
                   <a:srgbClr val="000000"/>
                 </a:solidFill>
@@ -1372,14 +1372,14 @@
               <ma14:placeholderFlag xmlns:ma14="http://schemas.microsoft.com/office/mac/drawingml/2011/main" val="1"/>
             </a:ext>
             <a:ext uri="{909E8E84-426E-40dd-AFC4-6F175D3DCCD1}">
-              <a14:hiddenFill xmlns:a14="http://schemas.microsoft.com/office/drawing/2010/main" xmlns="">
+              <a14:hiddenFill xmlns="" xmlns:a14="http://schemas.microsoft.com/office/drawing/2010/main">
                 <a:solidFill>
                   <a:srgbClr val="FFFFFF"/>
                 </a:solidFill>
               </a14:hiddenFill>
             </a:ext>
             <a:ext uri="{91240B29-F687-4f45-9708-019B960494DF}">
-              <a14:hiddenLine xmlns:a14="http://schemas.microsoft.com/office/drawing/2010/main" xmlns="" w="9525">
+              <a14:hiddenLine xmlns="" xmlns:a14="http://schemas.microsoft.com/office/drawing/2010/main" w="9525">
                 <a:solidFill>
                   <a:srgbClr val="000000"/>
                 </a:solidFill>
@@ -1449,14 +1449,14 @@
           </a:ln>
           <a:extLst>
             <a:ext uri="{909E8E84-426E-40dd-AFC4-6F175D3DCCD1}">
-              <a14:hiddenFill xmlns:a14="http://schemas.microsoft.com/office/drawing/2010/main" xmlns="">
+              <a14:hiddenFill xmlns="" xmlns:a14="http://schemas.microsoft.com/office/drawing/2010/main">
                 <a:solidFill>
                   <a:srgbClr val="FFFFFF"/>
                 </a:solidFill>
               </a14:hiddenFill>
             </a:ext>
             <a:ext uri="{91240B29-F687-4f45-9708-019B960494DF}">
-              <a14:hiddenLine xmlns:a14="http://schemas.microsoft.com/office/drawing/2010/main" xmlns="" w="9525">
+              <a14:hiddenLine xmlns="" xmlns:a14="http://schemas.microsoft.com/office/drawing/2010/main" w="9525">
                 <a:solidFill>
                   <a:srgbClr val="000000"/>
                 </a:solidFill>
@@ -1626,14 +1626,14 @@
               <ma14:placeholderFlag xmlns:ma14="http://schemas.microsoft.com/office/mac/drawingml/2011/main" val="1"/>
             </a:ext>
             <a:ext uri="{909E8E84-426E-40dd-AFC4-6F175D3DCCD1}">
-              <a14:hiddenFill xmlns:a14="http://schemas.microsoft.com/office/drawing/2010/main" xmlns="">
+              <a14:hiddenFill xmlns="" xmlns:a14="http://schemas.microsoft.com/office/drawing/2010/main">
                 <a:solidFill>
                   <a:srgbClr val="FFFFFF"/>
                 </a:solidFill>
               </a14:hiddenFill>
             </a:ext>
             <a:ext uri="{91240B29-F687-4f45-9708-019B960494DF}">
-              <a14:hiddenLine xmlns:a14="http://schemas.microsoft.com/office/drawing/2010/main" xmlns="" w="9525">
+              <a14:hiddenLine xmlns="" xmlns:a14="http://schemas.microsoft.com/office/drawing/2010/main" w="9525">
                 <a:solidFill>
                   <a:srgbClr val="000000"/>
                 </a:solidFill>
@@ -1703,14 +1703,14 @@
           </a:ln>
           <a:extLst>
             <a:ext uri="{909E8E84-426E-40dd-AFC4-6F175D3DCCD1}">
-              <a14:hiddenFill xmlns:a14="http://schemas.microsoft.com/office/drawing/2010/main" xmlns="">
+              <a14:hiddenFill xmlns="" xmlns:a14="http://schemas.microsoft.com/office/drawing/2010/main">
                 <a:solidFill>
                   <a:srgbClr val="FFFFFF"/>
                 </a:solidFill>
               </a14:hiddenFill>
             </a:ext>
             <a:ext uri="{91240B29-F687-4f45-9708-019B960494DF}">
-              <a14:hiddenLine xmlns:a14="http://schemas.microsoft.com/office/drawing/2010/main" xmlns="" w="9525">
+              <a14:hiddenLine xmlns="" xmlns:a14="http://schemas.microsoft.com/office/drawing/2010/main" w="9525">
                 <a:solidFill>
                   <a:srgbClr val="000000"/>
                 </a:solidFill>
@@ -1880,14 +1880,14 @@
               <ma14:placeholderFlag xmlns:ma14="http://schemas.microsoft.com/office/mac/drawingml/2011/main" val="1"/>
             </a:ext>
             <a:ext uri="{909E8E84-426E-40dd-AFC4-6F175D3DCCD1}">
-              <a14:hiddenFill xmlns:a14="http://schemas.microsoft.com/office/drawing/2010/main" xmlns="">
+              <a14:hiddenFill xmlns="" xmlns:a14="http://schemas.microsoft.com/office/drawing/2010/main">
                 <a:solidFill>
                   <a:srgbClr val="FFFFFF"/>
                 </a:solidFill>
               </a14:hiddenFill>
             </a:ext>
             <a:ext uri="{91240B29-F687-4f45-9708-019B960494DF}">
-              <a14:hiddenLine xmlns:a14="http://schemas.microsoft.com/office/drawing/2010/main" xmlns="" w="9525">
+              <a14:hiddenLine xmlns="" xmlns:a14="http://schemas.microsoft.com/office/drawing/2010/main" w="9525">
                 <a:solidFill>
                   <a:srgbClr val="000000"/>
                 </a:solidFill>
@@ -1950,14 +1950,14 @@
           <a:ln/>
           <a:extLst>
             <a:ext uri="{909E8E84-426E-40dd-AFC4-6F175D3DCCD1}">
-              <a14:hiddenFill xmlns:a14="http://schemas.microsoft.com/office/drawing/2010/main" xmlns="">
+              <a14:hiddenFill xmlns="" xmlns:a14="http://schemas.microsoft.com/office/drawing/2010/main">
                 <a:solidFill>
                   <a:srgbClr val="FFFFFF"/>
                 </a:solidFill>
               </a14:hiddenFill>
             </a:ext>
             <a:ext uri="{91240B29-F687-4f45-9708-019B960494DF}">
-              <a14:hiddenLine xmlns:a14="http://schemas.microsoft.com/office/drawing/2010/main" xmlns="" w="9525">
+              <a14:hiddenLine xmlns="" xmlns:a14="http://schemas.microsoft.com/office/drawing/2010/main" w="9525">
                 <a:solidFill>
                   <a:srgbClr val="000000"/>
                 </a:solidFill>
@@ -2127,14 +2127,14 @@
               <ma14:placeholderFlag xmlns:ma14="http://schemas.microsoft.com/office/mac/drawingml/2011/main" val="1"/>
             </a:ext>
             <a:ext uri="{909E8E84-426E-40dd-AFC4-6F175D3DCCD1}">
-              <a14:hiddenFill xmlns:a14="http://schemas.microsoft.com/office/drawing/2010/main" xmlns="">
+              <a14:hiddenFill xmlns="" xmlns:a14="http://schemas.microsoft.com/office/drawing/2010/main">
                 <a:solidFill>
                   <a:srgbClr val="FFFFFF"/>
                 </a:solidFill>
               </a14:hiddenFill>
             </a:ext>
             <a:ext uri="{91240B29-F687-4f45-9708-019B960494DF}">
-              <a14:hiddenLine xmlns:a14="http://schemas.microsoft.com/office/drawing/2010/main" xmlns="" w="9525">
+              <a14:hiddenLine xmlns="" xmlns:a14="http://schemas.microsoft.com/office/drawing/2010/main" w="9525">
                 <a:solidFill>
                   <a:srgbClr val="000000"/>
                 </a:solidFill>
@@ -2197,14 +2197,14 @@
           <a:ln/>
           <a:extLst>
             <a:ext uri="{909E8E84-426E-40dd-AFC4-6F175D3DCCD1}">
-              <a14:hiddenFill xmlns:a14="http://schemas.microsoft.com/office/drawing/2010/main" xmlns="">
+              <a14:hiddenFill xmlns="" xmlns:a14="http://schemas.microsoft.com/office/drawing/2010/main">
                 <a:solidFill>
                   <a:srgbClr val="FFFFFF"/>
                 </a:solidFill>
               </a14:hiddenFill>
             </a:ext>
             <a:ext uri="{91240B29-F687-4f45-9708-019B960494DF}">
-              <a14:hiddenLine xmlns:a14="http://schemas.microsoft.com/office/drawing/2010/main" xmlns="" w="9525">
+              <a14:hiddenLine xmlns="" xmlns:a14="http://schemas.microsoft.com/office/drawing/2010/main" w="9525">
                 <a:solidFill>
                   <a:srgbClr val="000000"/>
                 </a:solidFill>
@@ -2374,14 +2374,14 @@
               <ma14:placeholderFlag xmlns:ma14="http://schemas.microsoft.com/office/mac/drawingml/2011/main" val="1"/>
             </a:ext>
             <a:ext uri="{909E8E84-426E-40dd-AFC4-6F175D3DCCD1}">
-              <a14:hiddenFill xmlns:a14="http://schemas.microsoft.com/office/drawing/2010/main" xmlns="">
+              <a14:hiddenFill xmlns="" xmlns:a14="http://schemas.microsoft.com/office/drawing/2010/main">
                 <a:solidFill>
                   <a:srgbClr val="FFFFFF"/>
                 </a:solidFill>
               </a14:hiddenFill>
             </a:ext>
             <a:ext uri="{91240B29-F687-4f45-9708-019B960494DF}">
-              <a14:hiddenLine xmlns:a14="http://schemas.microsoft.com/office/drawing/2010/main" xmlns="" w="9525">
+              <a14:hiddenLine xmlns="" xmlns:a14="http://schemas.microsoft.com/office/drawing/2010/main" w="9525">
                 <a:solidFill>
                   <a:srgbClr val="000000"/>
                 </a:solidFill>
@@ -2444,14 +2444,14 @@
           <a:ln/>
           <a:extLst>
             <a:ext uri="{909E8E84-426E-40dd-AFC4-6F175D3DCCD1}">
-              <a14:hiddenFill xmlns:a14="http://schemas.microsoft.com/office/drawing/2010/main" xmlns="">
+              <a14:hiddenFill xmlns="" xmlns:a14="http://schemas.microsoft.com/office/drawing/2010/main">
                 <a:solidFill>
                   <a:srgbClr val="FFFFFF"/>
                 </a:solidFill>
               </a14:hiddenFill>
             </a:ext>
             <a:ext uri="{91240B29-F687-4f45-9708-019B960494DF}">
-              <a14:hiddenLine xmlns:a14="http://schemas.microsoft.com/office/drawing/2010/main" xmlns="" w="9525">
+              <a14:hiddenLine xmlns="" xmlns:a14="http://schemas.microsoft.com/office/drawing/2010/main" w="9525">
                 <a:solidFill>
                   <a:srgbClr val="000000"/>
                 </a:solidFill>
@@ -2621,14 +2621,14 @@
               <ma14:placeholderFlag xmlns:ma14="http://schemas.microsoft.com/office/mac/drawingml/2011/main" val="1"/>
             </a:ext>
             <a:ext uri="{909E8E84-426E-40dd-AFC4-6F175D3DCCD1}">
-              <a14:hiddenFill xmlns:a14="http://schemas.microsoft.com/office/drawing/2010/main" xmlns="">
+              <a14:hiddenFill xmlns="" xmlns:a14="http://schemas.microsoft.com/office/drawing/2010/main">
                 <a:solidFill>
                   <a:srgbClr val="FFFFFF"/>
                 </a:solidFill>
               </a14:hiddenFill>
             </a:ext>
             <a:ext uri="{91240B29-F687-4f45-9708-019B960494DF}">
-              <a14:hiddenLine xmlns:a14="http://schemas.microsoft.com/office/drawing/2010/main" xmlns="" w="9525">
+              <a14:hiddenLine xmlns="" xmlns:a14="http://schemas.microsoft.com/office/drawing/2010/main" w="9525">
                 <a:solidFill>
                   <a:srgbClr val="000000"/>
                 </a:solidFill>
@@ -2698,14 +2698,14 @@
           </a:ln>
           <a:extLst>
             <a:ext uri="{909E8E84-426E-40dd-AFC4-6F175D3DCCD1}">
-              <a14:hiddenFill xmlns:a14="http://schemas.microsoft.com/office/drawing/2010/main" xmlns="">
+              <a14:hiddenFill xmlns="" xmlns:a14="http://schemas.microsoft.com/office/drawing/2010/main">
                 <a:solidFill>
                   <a:srgbClr val="FFFFFF"/>
                 </a:solidFill>
               </a14:hiddenFill>
             </a:ext>
             <a:ext uri="{91240B29-F687-4f45-9708-019B960494DF}">
-              <a14:hiddenLine xmlns:a14="http://schemas.microsoft.com/office/drawing/2010/main" xmlns="" w="9525">
+              <a14:hiddenLine xmlns="" xmlns:a14="http://schemas.microsoft.com/office/drawing/2010/main" w="9525">
                 <a:solidFill>
                   <a:srgbClr val="000000"/>
                 </a:solidFill>
@@ -2936,14 +2936,14 @@
           <a:ln/>
           <a:extLst>
             <a:ext uri="{909E8E84-426E-40dd-AFC4-6F175D3DCCD1}">
-              <a14:hiddenFill xmlns:a14="http://schemas.microsoft.com/office/drawing/2010/main" xmlns="">
+              <a14:hiddenFill xmlns="" xmlns:a14="http://schemas.microsoft.com/office/drawing/2010/main">
                 <a:solidFill>
                   <a:srgbClr val="FFFFFF"/>
                 </a:solidFill>
               </a14:hiddenFill>
             </a:ext>
             <a:ext uri="{91240B29-F687-4f45-9708-019B960494DF}">
-              <a14:hiddenLine xmlns:a14="http://schemas.microsoft.com/office/drawing/2010/main" xmlns="" w="9525">
+              <a14:hiddenLine xmlns="" xmlns:a14="http://schemas.microsoft.com/office/drawing/2010/main" w="9525">
                 <a:solidFill>
                   <a:srgbClr val="000000"/>
                 </a:solidFill>
@@ -3113,14 +3113,14 @@
               <ma14:placeholderFlag xmlns:ma14="http://schemas.microsoft.com/office/mac/drawingml/2011/main" val="1"/>
             </a:ext>
             <a:ext uri="{909E8E84-426E-40dd-AFC4-6F175D3DCCD1}">
-              <a14:hiddenFill xmlns:a14="http://schemas.microsoft.com/office/drawing/2010/main" xmlns="">
+              <a14:hiddenFill xmlns="" xmlns:a14="http://schemas.microsoft.com/office/drawing/2010/main">
                 <a:solidFill>
                   <a:srgbClr val="FFFFFF"/>
                 </a:solidFill>
               </a14:hiddenFill>
             </a:ext>
             <a:ext uri="{91240B29-F687-4f45-9708-019B960494DF}">
-              <a14:hiddenLine xmlns:a14="http://schemas.microsoft.com/office/drawing/2010/main" xmlns="" w="9525">
+              <a14:hiddenLine xmlns="" xmlns:a14="http://schemas.microsoft.com/office/drawing/2010/main" w="9525">
                 <a:solidFill>
                   <a:srgbClr val="000000"/>
                 </a:solidFill>
@@ -3183,14 +3183,14 @@
           <a:ln/>
           <a:extLst>
             <a:ext uri="{909E8E84-426E-40dd-AFC4-6F175D3DCCD1}">
-              <a14:hiddenFill xmlns:a14="http://schemas.microsoft.com/office/drawing/2010/main" xmlns="">
+              <a14:hiddenFill xmlns="" xmlns:a14="http://schemas.microsoft.com/office/drawing/2010/main">
                 <a:solidFill>
                   <a:srgbClr val="FFFFFF"/>
                 </a:solidFill>
               </a14:hiddenFill>
             </a:ext>
             <a:ext uri="{91240B29-F687-4f45-9708-019B960494DF}">
-              <a14:hiddenLine xmlns:a14="http://schemas.microsoft.com/office/drawing/2010/main" xmlns="" w="9525">
+              <a14:hiddenLine xmlns="" xmlns:a14="http://schemas.microsoft.com/office/drawing/2010/main" w="9525">
                 <a:solidFill>
                   <a:srgbClr val="000000"/>
                 </a:solidFill>
@@ -3360,14 +3360,14 @@
               <ma14:placeholderFlag xmlns:ma14="http://schemas.microsoft.com/office/mac/drawingml/2011/main" val="1"/>
             </a:ext>
             <a:ext uri="{909E8E84-426E-40dd-AFC4-6F175D3DCCD1}">
-              <a14:hiddenFill xmlns:a14="http://schemas.microsoft.com/office/drawing/2010/main" xmlns="">
+              <a14:hiddenFill xmlns="" xmlns:a14="http://schemas.microsoft.com/office/drawing/2010/main">
                 <a:solidFill>
                   <a:srgbClr val="FFFFFF"/>
                 </a:solidFill>
               </a14:hiddenFill>
             </a:ext>
             <a:ext uri="{91240B29-F687-4f45-9708-019B960494DF}">
-              <a14:hiddenLine xmlns:a14="http://schemas.microsoft.com/office/drawing/2010/main" xmlns="" w="9525">
+              <a14:hiddenLine xmlns="" xmlns:a14="http://schemas.microsoft.com/office/drawing/2010/main" w="9525">
                 <a:solidFill>
                   <a:srgbClr val="000000"/>
                 </a:solidFill>
@@ -3430,14 +3430,14 @@
           <a:ln/>
           <a:extLst>
             <a:ext uri="{909E8E84-426E-40dd-AFC4-6F175D3DCCD1}">
-              <a14:hiddenFill xmlns:a14="http://schemas.microsoft.com/office/drawing/2010/main" xmlns="">
+              <a14:hiddenFill xmlns="" xmlns:a14="http://schemas.microsoft.com/office/drawing/2010/main">
                 <a:solidFill>
                   <a:srgbClr val="FFFFFF"/>
                 </a:solidFill>
               </a14:hiddenFill>
             </a:ext>
             <a:ext uri="{91240B29-F687-4f45-9708-019B960494DF}">
-              <a14:hiddenLine xmlns:a14="http://schemas.microsoft.com/office/drawing/2010/main" xmlns="" w="9525">
+              <a14:hiddenLine xmlns="" xmlns:a14="http://schemas.microsoft.com/office/drawing/2010/main" w="9525">
                 <a:solidFill>
                   <a:srgbClr val="000000"/>
                 </a:solidFill>
@@ -3607,14 +3607,14 @@
               <ma14:placeholderFlag xmlns:ma14="http://schemas.microsoft.com/office/mac/drawingml/2011/main" val="1"/>
             </a:ext>
             <a:ext uri="{909E8E84-426E-40dd-AFC4-6F175D3DCCD1}">
-              <a14:hiddenFill xmlns:a14="http://schemas.microsoft.com/office/drawing/2010/main" xmlns="">
+              <a14:hiddenFill xmlns="" xmlns:a14="http://schemas.microsoft.com/office/drawing/2010/main">
                 <a:solidFill>
                   <a:srgbClr val="FFFFFF"/>
                 </a:solidFill>
               </a14:hiddenFill>
             </a:ext>
             <a:ext uri="{91240B29-F687-4f45-9708-019B960494DF}">
-              <a14:hiddenLine xmlns:a14="http://schemas.microsoft.com/office/drawing/2010/main" xmlns="" w="9525">
+              <a14:hiddenLine xmlns="" xmlns:a14="http://schemas.microsoft.com/office/drawing/2010/main" w="9525">
                 <a:solidFill>
                   <a:srgbClr val="000000"/>
                 </a:solidFill>
@@ -3677,14 +3677,14 @@
           <a:ln/>
           <a:extLst>
             <a:ext uri="{909E8E84-426E-40dd-AFC4-6F175D3DCCD1}">
-              <a14:hiddenFill xmlns:a14="http://schemas.microsoft.com/office/drawing/2010/main" xmlns="">
+              <a14:hiddenFill xmlns="" xmlns:a14="http://schemas.microsoft.com/office/drawing/2010/main">
                 <a:solidFill>
                   <a:srgbClr val="FFFFFF"/>
                 </a:solidFill>
               </a14:hiddenFill>
             </a:ext>
             <a:ext uri="{91240B29-F687-4f45-9708-019B960494DF}">
-              <a14:hiddenLine xmlns:a14="http://schemas.microsoft.com/office/drawing/2010/main" xmlns="" w="9525">
+              <a14:hiddenLine xmlns="" xmlns:a14="http://schemas.microsoft.com/office/drawing/2010/main" w="9525">
                 <a:solidFill>
                   <a:srgbClr val="000000"/>
                 </a:solidFill>
@@ -3854,14 +3854,14 @@
               <ma14:placeholderFlag xmlns:ma14="http://schemas.microsoft.com/office/mac/drawingml/2011/main" val="1"/>
             </a:ext>
             <a:ext uri="{909E8E84-426E-40dd-AFC4-6F175D3DCCD1}">
-              <a14:hiddenFill xmlns:a14="http://schemas.microsoft.com/office/drawing/2010/main" xmlns="">
+              <a14:hiddenFill xmlns="" xmlns:a14="http://schemas.microsoft.com/office/drawing/2010/main">
                 <a:solidFill>
                   <a:srgbClr val="FFFFFF"/>
                 </a:solidFill>
               </a14:hiddenFill>
             </a:ext>
             <a:ext uri="{91240B29-F687-4f45-9708-019B960494DF}">
-              <a14:hiddenLine xmlns:a14="http://schemas.microsoft.com/office/drawing/2010/main" xmlns="" w="9525">
+              <a14:hiddenLine xmlns="" xmlns:a14="http://schemas.microsoft.com/office/drawing/2010/main" w="9525">
                 <a:solidFill>
                   <a:srgbClr val="000000"/>
                 </a:solidFill>
@@ -3924,14 +3924,14 @@
           <a:ln/>
           <a:extLst>
             <a:ext uri="{909E8E84-426E-40dd-AFC4-6F175D3DCCD1}">
-              <a14:hiddenFill xmlns:a14="http://schemas.microsoft.com/office/drawing/2010/main" xmlns="">
+              <a14:hiddenFill xmlns="" xmlns:a14="http://schemas.microsoft.com/office/drawing/2010/main">
                 <a:solidFill>
                   <a:srgbClr val="FFFFFF"/>
                 </a:solidFill>
               </a14:hiddenFill>
             </a:ext>
             <a:ext uri="{91240B29-F687-4f45-9708-019B960494DF}">
-              <a14:hiddenLine xmlns:a14="http://schemas.microsoft.com/office/drawing/2010/main" xmlns="" w="9525">
+              <a14:hiddenLine xmlns="" xmlns:a14="http://schemas.microsoft.com/office/drawing/2010/main" w="9525">
                 <a:solidFill>
                   <a:srgbClr val="000000"/>
                 </a:solidFill>
@@ -4101,14 +4101,14 @@
               <ma14:placeholderFlag xmlns:ma14="http://schemas.microsoft.com/office/mac/drawingml/2011/main" val="1"/>
             </a:ext>
             <a:ext uri="{909E8E84-426E-40dd-AFC4-6F175D3DCCD1}">
-              <a14:hiddenFill xmlns:a14="http://schemas.microsoft.com/office/drawing/2010/main" xmlns="">
+              <a14:hiddenFill xmlns="" xmlns:a14="http://schemas.microsoft.com/office/drawing/2010/main">
                 <a:solidFill>
                   <a:srgbClr val="FFFFFF"/>
                 </a:solidFill>
               </a14:hiddenFill>
             </a:ext>
             <a:ext uri="{91240B29-F687-4f45-9708-019B960494DF}">
-              <a14:hiddenLine xmlns:a14="http://schemas.microsoft.com/office/drawing/2010/main" xmlns="" w="9525">
+              <a14:hiddenLine xmlns="" xmlns:a14="http://schemas.microsoft.com/office/drawing/2010/main" w="9525">
                 <a:solidFill>
                   <a:srgbClr val="000000"/>
                 </a:solidFill>
@@ -7415,14 +7415,14 @@
               <ma14:placeholderFlag xmlns:ma14="http://schemas.microsoft.com/office/mac/drawingml/2011/main" val="1"/>
             </a:ext>
             <a:ext uri="{909E8E84-426E-40dd-AFC4-6F175D3DCCD1}">
-              <a14:hiddenFill xmlns:a14="http://schemas.microsoft.com/office/drawing/2010/main" xmlns="">
+              <a14:hiddenFill xmlns="" xmlns:a14="http://schemas.microsoft.com/office/drawing/2010/main">
                 <a:solidFill>
                   <a:srgbClr val="FFFFFF"/>
                 </a:solidFill>
               </a14:hiddenFill>
             </a:ext>
             <a:ext uri="{91240B29-F687-4f45-9708-019B960494DF}">
-              <a14:hiddenLine xmlns:a14="http://schemas.microsoft.com/office/drawing/2010/main" xmlns="" w="9525">
+              <a14:hiddenLine xmlns="" xmlns:a14="http://schemas.microsoft.com/office/drawing/2010/main" w="9525">
                 <a:solidFill>
                   <a:srgbClr val="000000"/>
                 </a:solidFill>
@@ -7481,7 +7481,7 @@
           </a:ln>
           <a:extLst>
             <a:ext uri="{91240B29-F687-4f45-9708-019B960494DF}">
-              <a14:hiddenLine xmlns:a14="http://schemas.microsoft.com/office/drawing/2010/main" xmlns="" w="9525">
+              <a14:hiddenLine xmlns="" xmlns:a14="http://schemas.microsoft.com/office/drawing/2010/main" w="9525">
                 <a:solidFill>
                   <a:srgbClr val="000000"/>
                 </a:solidFill>
@@ -7685,14 +7685,14 @@
           </a:ln>
           <a:extLst>
             <a:ext uri="{909E8E84-426E-40dd-AFC4-6F175D3DCCD1}">
-              <a14:hiddenFill xmlns:a14="http://schemas.microsoft.com/office/drawing/2010/main" xmlns="">
+              <a14:hiddenFill xmlns="" xmlns:a14="http://schemas.microsoft.com/office/drawing/2010/main">
                 <a:solidFill>
                   <a:srgbClr val="FFFFFF"/>
                 </a:solidFill>
               </a14:hiddenFill>
             </a:ext>
             <a:ext uri="{91240B29-F687-4f45-9708-019B960494DF}">
-              <a14:hiddenLine xmlns:a14="http://schemas.microsoft.com/office/drawing/2010/main" xmlns="" w="9525">
+              <a14:hiddenLine xmlns="" xmlns:a14="http://schemas.microsoft.com/office/drawing/2010/main" w="9525">
                 <a:solidFill>
                   <a:srgbClr val="000000"/>
                 </a:solidFill>
@@ -8025,14 +8025,14 @@
           </a:ln>
           <a:extLst>
             <a:ext uri="{909E8E84-426E-40dd-AFC4-6F175D3DCCD1}">
-              <a14:hiddenFill xmlns:a14="http://schemas.microsoft.com/office/drawing/2010/main" xmlns="">
+              <a14:hiddenFill xmlns="" xmlns:a14="http://schemas.microsoft.com/office/drawing/2010/main">
                 <a:solidFill>
                   <a:srgbClr val="FFFFFF"/>
                 </a:solidFill>
               </a14:hiddenFill>
             </a:ext>
             <a:ext uri="{91240B29-F687-4f45-9708-019B960494DF}">
-              <a14:hiddenLine xmlns:a14="http://schemas.microsoft.com/office/drawing/2010/main" xmlns="" w="9525">
+              <a14:hiddenLine xmlns="" xmlns:a14="http://schemas.microsoft.com/office/drawing/2010/main" w="9525">
                 <a:solidFill>
                   <a:srgbClr val="000000"/>
                 </a:solidFill>
@@ -8079,14 +8079,14 @@
           </a:ln>
           <a:extLst>
             <a:ext uri="{909E8E84-426E-40dd-AFC4-6F175D3DCCD1}">
-              <a14:hiddenFill xmlns:a14="http://schemas.microsoft.com/office/drawing/2010/main" xmlns="">
+              <a14:hiddenFill xmlns="" xmlns:a14="http://schemas.microsoft.com/office/drawing/2010/main">
                 <a:solidFill>
                   <a:srgbClr val="FFFFFF"/>
                 </a:solidFill>
               </a14:hiddenFill>
             </a:ext>
             <a:ext uri="{91240B29-F687-4f45-9708-019B960494DF}">
-              <a14:hiddenLine xmlns:a14="http://schemas.microsoft.com/office/drawing/2010/main" xmlns="" w="9525">
+              <a14:hiddenLine xmlns="" xmlns:a14="http://schemas.microsoft.com/office/drawing/2010/main" w="9525">
                 <a:solidFill>
                   <a:srgbClr val="000000"/>
                 </a:solidFill>
@@ -8764,14 +8764,14 @@
           <a:ln/>
           <a:extLst>
             <a:ext uri="{909E8E84-426E-40dd-AFC4-6F175D3DCCD1}">
-              <a14:hiddenFill xmlns:a14="http://schemas.microsoft.com/office/drawing/2010/main" xmlns="">
+              <a14:hiddenFill xmlns="" xmlns:a14="http://schemas.microsoft.com/office/drawing/2010/main">
                 <a:solidFill>
                   <a:srgbClr val="FFFFFF"/>
                 </a:solidFill>
               </a14:hiddenFill>
             </a:ext>
             <a:ext uri="{91240B29-F687-4f45-9708-019B960494DF}">
-              <a14:hiddenLine xmlns:a14="http://schemas.microsoft.com/office/drawing/2010/main" xmlns="" w="9525">
+              <a14:hiddenLine xmlns="" xmlns:a14="http://schemas.microsoft.com/office/drawing/2010/main" w="9525">
                 <a:solidFill>
                   <a:srgbClr val="000000"/>
                 </a:solidFill>
@@ -8958,14 +8958,14 @@
           <a:ln/>
           <a:extLst>
             <a:ext uri="{909E8E84-426E-40dd-AFC4-6F175D3DCCD1}">
-              <a14:hiddenFill xmlns:a14="http://schemas.microsoft.com/office/drawing/2010/main" xmlns="">
+              <a14:hiddenFill xmlns="" xmlns:a14="http://schemas.microsoft.com/office/drawing/2010/main">
                 <a:solidFill>
                   <a:srgbClr val="FFFFFF"/>
                 </a:solidFill>
               </a14:hiddenFill>
             </a:ext>
             <a:ext uri="{91240B29-F687-4f45-9708-019B960494DF}">
-              <a14:hiddenLine xmlns:a14="http://schemas.microsoft.com/office/drawing/2010/main" xmlns="" w="9525">
+              <a14:hiddenLine xmlns="" xmlns:a14="http://schemas.microsoft.com/office/drawing/2010/main" w="9525">
                 <a:solidFill>
                   <a:srgbClr val="000000"/>
                 </a:solidFill>
@@ -11347,14 +11347,14 @@
           <a:ln/>
           <a:extLst>
             <a:ext uri="{909E8E84-426E-40dd-AFC4-6F175D3DCCD1}">
-              <a14:hiddenFill xmlns:a14="http://schemas.microsoft.com/office/drawing/2010/main" xmlns="">
+              <a14:hiddenFill xmlns="" xmlns:a14="http://schemas.microsoft.com/office/drawing/2010/main">
                 <a:solidFill>
                   <a:srgbClr val="FFFFFF"/>
                 </a:solidFill>
               </a14:hiddenFill>
             </a:ext>
             <a:ext uri="{91240B29-F687-4f45-9708-019B960494DF}">
-              <a14:hiddenLine xmlns:a14="http://schemas.microsoft.com/office/drawing/2010/main" xmlns="" w="9525">
+              <a14:hiddenLine xmlns="" xmlns:a14="http://schemas.microsoft.com/office/drawing/2010/main" w="9525">
                 <a:solidFill>
                   <a:srgbClr val="000000"/>
                 </a:solidFill>
@@ -11529,14 +11529,14 @@
           <p:nvPr>
             <p:extLst>
               <p:ext uri="{D42A27DB-BD31-4B8C-83A1-F6EECF244321}">
-                <p14:modId xmlns:p14="http://schemas.microsoft.com/office/powerpoint/2010/main" val="1516263846"/>
+                <p14:modId xmlns:p14="http://schemas.microsoft.com/office/powerpoint/2010/main" val="822487263"/>
               </p:ext>
             </p:extLst>
           </p:nvPr>
         </p:nvGraphicFramePr>
         <p:xfrm>
           <a:off x="287869" y="1187450"/>
-          <a:ext cx="8449732" cy="4036616"/>
+          <a:ext cx="8449732" cy="4341360"/>
         </p:xfrm>
         <a:graphic>
           <a:graphicData uri="http://schemas.openxmlformats.org/drawingml/2006/table">
@@ -11870,7 +11870,7 @@
                         <a:defRPr/>
                       </a:pPr>
                       <a:r>
-                        <a:rPr kumimoji="0" lang="en-US" sz="1400" b="0" i="0" u="none" strike="noStrike" kern="1200" cap="none" normalizeH="0" baseline="0" smtClean="0">
+                        <a:rPr kumimoji="0" lang="en-US" sz="1400" b="0" i="0" u="none" strike="noStrike" kern="1200" cap="none" normalizeH="0" baseline="0" dirty="0" err="1" smtClean="0">
                           <a:ln>
                             <a:noFill/>
                           </a:ln>
@@ -11882,9 +11882,24 @@
                           <a:ea typeface="ヒラギノ角ゴ Pro W3" pitchFamily="-112" charset="-128"/>
                           <a:cs typeface="ヒラギノ角ゴ Pro W3" pitchFamily="-112" charset="-128"/>
                         </a:rPr>
-                        <a:t>int SUB_PIPE_DEPTH</a:t>
+                        <a:t>int</a:t>
                       </a:r>
-                      <a:endParaRPr kumimoji="0" lang="en-US" sz="1400" b="0" i="0" u="none" strike="noStrike" kern="1200" cap="none" normalizeH="0" baseline="0">
+                      <a:r>
+                        <a:rPr kumimoji="0" lang="en-US" sz="1400" b="0" i="0" u="none" strike="noStrike" kern="1200" cap="none" normalizeH="0" baseline="0" dirty="0" smtClean="0">
+                          <a:ln>
+                            <a:noFill/>
+                          </a:ln>
+                          <a:solidFill>
+                            <a:schemeClr val="tx1"/>
+                          </a:solidFill>
+                          <a:effectLst/>
+                          <a:latin typeface="Arial" pitchFamily="-112" charset="0"/>
+                          <a:ea typeface="ヒラギノ角ゴ Pro W3" pitchFamily="-112" charset="-128"/>
+                          <a:cs typeface="ヒラギノ角ゴ Pro W3" pitchFamily="-112" charset="-128"/>
+                        </a:rPr>
+                        <a:t> MAX_NETWORK_PEERS</a:t>
+                      </a:r>
+                      <a:endParaRPr kumimoji="0" lang="en-US" sz="1400" b="0" i="0" u="none" strike="noStrike" kern="1200" cap="none" normalizeH="0" baseline="0" dirty="0">
                         <a:ln>
                           <a:noFill/>
                         </a:ln>
@@ -11967,7 +11982,7 @@
                         <a:defRPr/>
                       </a:pPr>
                       <a:r>
-                        <a:rPr kumimoji="0" lang="en-US" sz="1400" b="0" i="0" u="none" strike="noStrike" kern="1200" cap="none" normalizeH="0" baseline="0">
+                        <a:rPr kumimoji="0" lang="en-US" sz="1400" b="0" i="0" u="none" strike="noStrike" kern="1200" cap="none" normalizeH="0" baseline="0" dirty="0" smtClean="0">
                           <a:ln>
                             <a:noFill/>
                           </a:ln>
@@ -11979,8 +11994,20 @@
                           <a:ea typeface="ヒラギノ角ゴ Pro W3" pitchFamily="-112" charset="-128"/>
                           <a:cs typeface="ヒラギノ角ゴ Pro W3" pitchFamily="-112" charset="-128"/>
                         </a:rPr>
-                        <a:t>256</a:t>
+                        <a:t>4</a:t>
                       </a:r>
+                      <a:endParaRPr kumimoji="0" lang="en-US" sz="1400" b="0" i="0" u="none" strike="noStrike" kern="1200" cap="none" normalizeH="0" baseline="0" dirty="0">
+                        <a:ln>
+                          <a:noFill/>
+                        </a:ln>
+                        <a:solidFill>
+                          <a:schemeClr val="tx1"/>
+                        </a:solidFill>
+                        <a:effectLst/>
+                        <a:latin typeface="Arial" pitchFamily="-112" charset="0"/>
+                        <a:ea typeface="ヒラギノ角ゴ Pro W3" pitchFamily="-112" charset="-128"/>
+                        <a:cs typeface="ヒラギノ角ゴ Pro W3" pitchFamily="-112" charset="-128"/>
+                      </a:endParaRPr>
                     </a:p>
                   </a:txBody>
                   <a:tcPr marT="45692" marB="45692" horzOverflow="overflow">
@@ -12051,7 +12078,302 @@
                         <a:tabLst/>
                       </a:pPr>
                       <a:r>
-                        <a:rPr kumimoji="0" lang="en-US" sz="1400" b="0" i="0" u="none" strike="noStrike" cap="none" normalizeH="0" baseline="0">
+                        <a:rPr kumimoji="0" lang="en-US" sz="1400" b="0" i="0" u="none" strike="noStrike" cap="none" normalizeH="0" baseline="0" dirty="0" smtClean="0">
+                          <a:ln>
+                            <a:noFill/>
+                          </a:ln>
+                          <a:solidFill>
+                            <a:schemeClr val="tx1"/>
+                          </a:solidFill>
+                          <a:effectLst/>
+                          <a:latin typeface="Arial" pitchFamily="-112" charset="0"/>
+                          <a:ea typeface="ヒラギノ角ゴ Pro W3" pitchFamily="-112" charset="-128"/>
+                          <a:cs typeface="ヒラギノ角ゴ Pro W3" pitchFamily="-112" charset="-128"/>
+                        </a:rPr>
+                        <a:t>Number of peers allowed a network.</a:t>
+                      </a:r>
+                      <a:endParaRPr kumimoji="0" lang="en-US" sz="1400" b="0" i="0" u="none" strike="noStrike" cap="none" normalizeH="0" baseline="0" dirty="0">
+                        <a:ln>
+                          <a:noFill/>
+                        </a:ln>
+                        <a:solidFill>
+                          <a:schemeClr val="tx1"/>
+                        </a:solidFill>
+                        <a:effectLst/>
+                        <a:latin typeface="Arial" pitchFamily="-112" charset="0"/>
+                        <a:ea typeface="ヒラギノ角ゴ Pro W3" pitchFamily="-112" charset="-128"/>
+                        <a:cs typeface="ヒラギノ角ゴ Pro W3" pitchFamily="-112" charset="-128"/>
+                      </a:endParaRPr>
+                    </a:p>
+                  </a:txBody>
+                  <a:tcPr marT="45692" marB="45692" horzOverflow="overflow">
+                    <a:lnL w="12700" cap="flat" cmpd="sng" algn="ctr">
+                      <a:solidFill>
+                        <a:schemeClr val="tx1"/>
+                      </a:solidFill>
+                      <a:prstDash val="solid"/>
+                      <a:round/>
+                      <a:headEnd type="none" w="med" len="med"/>
+                      <a:tailEnd type="none" w="med" len="med"/>
+                    </a:lnL>
+                    <a:lnR w="28575" cap="flat" cmpd="sng" algn="ctr">
+                      <a:solidFill>
+                        <a:scrgbClr r="0" g="0" b="0"/>
+                      </a:solidFill>
+                      <a:prstDash val="solid"/>
+                      <a:round/>
+                      <a:headEnd type="none" w="med" len="med"/>
+                      <a:tailEnd type="none" w="med" len="med"/>
+                    </a:lnR>
+                    <a:lnT w="28575" cap="flat" cmpd="sng" algn="ctr">
+                      <a:solidFill>
+                        <a:scrgbClr r="0" g="0" b="0"/>
+                      </a:solidFill>
+                      <a:prstDash val="solid"/>
+                      <a:round/>
+                      <a:headEnd type="none" w="med" len="med"/>
+                      <a:tailEnd type="none" w="med" len="med"/>
+                    </a:lnT>
+                    <a:lnB w="12700" cap="flat" cmpd="sng" algn="ctr">
+                      <a:solidFill>
+                        <a:schemeClr val="tx1"/>
+                      </a:solidFill>
+                      <a:prstDash val="solid"/>
+                      <a:round/>
+                      <a:headEnd type="none" w="med" len="med"/>
+                      <a:tailEnd type="none" w="med" len="med"/>
+                    </a:lnB>
+                    <a:lnTlToBr>
+                      <a:noFill/>
+                    </a:lnTlToBr>
+                    <a:lnBlToTr>
+                      <a:noFill/>
+                    </a:lnBlToTr>
+                    <a:noFill/>
+                  </a:tcPr>
+                </a:tc>
+              </a:tr>
+              <a:tr h="0">
+                <a:tc>
+                  <a:txBody>
+                    <a:bodyPr/>
+                    <a:lstStyle/>
+                    <a:p>
+                      <a:pPr marL="0" marR="0" lvl="0" indent="0" algn="l" defTabSz="914400" rtl="0" eaLnBrk="0" fontAlgn="base" latinLnBrk="0" hangingPunct="0">
+                        <a:lnSpc>
+                          <a:spcPct val="100000"/>
+                        </a:lnSpc>
+                        <a:spcBef>
+                          <a:spcPct val="35000"/>
+                        </a:spcBef>
+                        <a:spcAft>
+                          <a:spcPct val="0"/>
+                        </a:spcAft>
+                        <a:buClrTx/>
+                        <a:buSzTx/>
+                        <a:buFontTx/>
+                        <a:buNone/>
+                        <a:tabLst/>
+                        <a:defRPr/>
+                      </a:pPr>
+                      <a:r>
+                        <a:rPr kumimoji="0" lang="en-US" sz="1400" b="0" i="0" u="none" strike="noStrike" kern="1200" cap="none" normalizeH="0" baseline="0" dirty="0" err="1" smtClean="0">
+                          <a:ln>
+                            <a:noFill/>
+                          </a:ln>
+                          <a:solidFill>
+                            <a:schemeClr val="tx1"/>
+                          </a:solidFill>
+                          <a:effectLst/>
+                          <a:latin typeface="Arial" pitchFamily="-112" charset="0"/>
+                          <a:ea typeface="ヒラギノ角ゴ Pro W3" pitchFamily="-112" charset="-128"/>
+                          <a:cs typeface="ヒラギノ角ゴ Pro W3" pitchFamily="-112" charset="-128"/>
+                        </a:rPr>
+                        <a:t>int</a:t>
+                      </a:r>
+                      <a:r>
+                        <a:rPr kumimoji="0" lang="en-US" sz="1400" b="0" i="0" u="none" strike="noStrike" kern="1200" cap="none" normalizeH="0" baseline="0" dirty="0" smtClean="0">
+                          <a:ln>
+                            <a:noFill/>
+                          </a:ln>
+                          <a:solidFill>
+                            <a:schemeClr val="tx1"/>
+                          </a:solidFill>
+                          <a:effectLst/>
+                          <a:latin typeface="Arial" pitchFamily="-112" charset="0"/>
+                          <a:ea typeface="ヒラギノ角ゴ Pro W3" pitchFamily="-112" charset="-128"/>
+                          <a:cs typeface="ヒラギノ角ゴ Pro W3" pitchFamily="-112" charset="-128"/>
+                        </a:rPr>
+                        <a:t> SUB_PIPE_DEPTH</a:t>
+                      </a:r>
+                      <a:endParaRPr kumimoji="0" lang="en-US" sz="1400" b="0" i="0" u="none" strike="noStrike" kern="1200" cap="none" normalizeH="0" baseline="0" dirty="0">
+                        <a:ln>
+                          <a:noFill/>
+                        </a:ln>
+                        <a:solidFill>
+                          <a:schemeClr val="tx1"/>
+                        </a:solidFill>
+                        <a:effectLst/>
+                        <a:latin typeface="Arial" pitchFamily="-112" charset="0"/>
+                        <a:ea typeface="ヒラギノ角ゴ Pro W3" pitchFamily="-112" charset="-128"/>
+                        <a:cs typeface="ヒラギノ角ゴ Pro W3" pitchFamily="-112" charset="-128"/>
+                      </a:endParaRPr>
+                    </a:p>
+                  </a:txBody>
+                  <a:tcPr marT="45692" marB="45692" horzOverflow="overflow">
+                    <a:lnL w="28575" cap="flat" cmpd="sng" algn="ctr">
+                      <a:solidFill>
+                        <a:scrgbClr r="0" g="0" b="0"/>
+                      </a:solidFill>
+                      <a:prstDash val="solid"/>
+                      <a:round/>
+                      <a:headEnd type="none" w="med" len="med"/>
+                      <a:tailEnd type="none" w="med" len="med"/>
+                    </a:lnL>
+                    <a:lnR w="12700" cap="flat" cmpd="sng" algn="ctr">
+                      <a:solidFill>
+                        <a:schemeClr val="tx1"/>
+                      </a:solidFill>
+                      <a:prstDash val="solid"/>
+                      <a:round/>
+                      <a:headEnd type="none" w="med" len="med"/>
+                      <a:tailEnd type="none" w="med" len="med"/>
+                    </a:lnR>
+                    <a:lnT w="12700" cap="flat" cmpd="sng" algn="ctr">
+                      <a:solidFill>
+                        <a:schemeClr val="tx1"/>
+                      </a:solidFill>
+                      <a:prstDash val="solid"/>
+                      <a:round/>
+                      <a:headEnd type="none" w="med" len="med"/>
+                      <a:tailEnd type="none" w="med" len="med"/>
+                    </a:lnT>
+                    <a:lnB w="12700" cap="flat" cmpd="sng" algn="ctr">
+                      <a:solidFill>
+                        <a:schemeClr val="tx1"/>
+                      </a:solidFill>
+                      <a:prstDash val="solid"/>
+                      <a:round/>
+                      <a:headEnd type="none" w="med" len="med"/>
+                      <a:tailEnd type="none" w="med" len="med"/>
+                    </a:lnB>
+                    <a:lnTlToBr>
+                      <a:noFill/>
+                    </a:lnTlToBr>
+                    <a:lnBlToTr>
+                      <a:noFill/>
+                    </a:lnBlToTr>
+                    <a:noFill/>
+                  </a:tcPr>
+                </a:tc>
+                <a:tc>
+                  <a:txBody>
+                    <a:bodyPr/>
+                    <a:lstStyle/>
+                    <a:p>
+                      <a:pPr marL="0" marR="0" lvl="0" indent="0" algn="l" defTabSz="914400" rtl="0" eaLnBrk="0" fontAlgn="base" latinLnBrk="0" hangingPunct="0">
+                        <a:lnSpc>
+                          <a:spcPct val="100000"/>
+                        </a:lnSpc>
+                        <a:spcBef>
+                          <a:spcPct val="35000"/>
+                        </a:spcBef>
+                        <a:spcAft>
+                          <a:spcPct val="0"/>
+                        </a:spcAft>
+                        <a:buClrTx/>
+                        <a:buSzTx/>
+                        <a:buFontTx/>
+                        <a:buNone/>
+                        <a:tabLst/>
+                        <a:defRPr/>
+                      </a:pPr>
+                      <a:r>
+                        <a:rPr kumimoji="0" lang="en-US" sz="1400" b="0" i="0" u="none" strike="noStrike" kern="1200" cap="none" normalizeH="0" baseline="0" dirty="0">
+                          <a:ln>
+                            <a:noFill/>
+                          </a:ln>
+                          <a:solidFill>
+                            <a:schemeClr val="tx1"/>
+                          </a:solidFill>
+                          <a:effectLst/>
+                          <a:latin typeface="Arial" pitchFamily="-112" charset="0"/>
+                          <a:ea typeface="ヒラギノ角ゴ Pro W3" pitchFamily="-112" charset="-128"/>
+                          <a:cs typeface="ヒラギノ角ゴ Pro W3" pitchFamily="-112" charset="-128"/>
+                        </a:rPr>
+                        <a:t>256</a:t>
+                      </a:r>
+                    </a:p>
+                  </a:txBody>
+                  <a:tcPr marT="45692" marB="45692" horzOverflow="overflow">
+                    <a:lnL w="12700" cap="flat" cmpd="sng" algn="ctr">
+                      <a:solidFill>
+                        <a:schemeClr val="tx1"/>
+                      </a:solidFill>
+                      <a:prstDash val="solid"/>
+                      <a:round/>
+                      <a:headEnd type="none" w="med" len="med"/>
+                      <a:tailEnd type="none" w="med" len="med"/>
+                    </a:lnL>
+                    <a:lnR w="12700" cap="flat" cmpd="sng" algn="ctr">
+                      <a:solidFill>
+                        <a:schemeClr val="tx1"/>
+                      </a:solidFill>
+                      <a:prstDash val="solid"/>
+                      <a:round/>
+                      <a:headEnd type="none" w="med" len="med"/>
+                      <a:tailEnd type="none" w="med" len="med"/>
+                    </a:lnR>
+                    <a:lnT w="12700" cap="flat" cmpd="sng" algn="ctr">
+                      <a:solidFill>
+                        <a:schemeClr val="tx1"/>
+                      </a:solidFill>
+                      <a:prstDash val="solid"/>
+                      <a:round/>
+                      <a:headEnd type="none" w="med" len="med"/>
+                      <a:tailEnd type="none" w="med" len="med"/>
+                    </a:lnT>
+                    <a:lnB w="12700" cap="flat" cmpd="sng" algn="ctr">
+                      <a:solidFill>
+                        <a:schemeClr val="tx1"/>
+                      </a:solidFill>
+                      <a:prstDash val="solid"/>
+                      <a:round/>
+                      <a:headEnd type="none" w="med" len="med"/>
+                      <a:tailEnd type="none" w="med" len="med"/>
+                    </a:lnB>
+                    <a:lnTlToBr>
+                      <a:noFill/>
+                    </a:lnTlToBr>
+                    <a:lnBlToTr>
+                      <a:noFill/>
+                    </a:lnBlToTr>
+                    <a:noFill/>
+                  </a:tcPr>
+                </a:tc>
+                <a:tc>
+                  <a:txBody>
+                    <a:bodyPr/>
+                    <a:lstStyle/>
+                    <a:p>
+                      <a:pPr marL="0" marR="0" lvl="0" indent="0" algn="l" defTabSz="914400" rtl="0" eaLnBrk="0" fontAlgn="base" latinLnBrk="0" hangingPunct="0">
+                        <a:lnSpc>
+                          <a:spcPct val="100000"/>
+                        </a:lnSpc>
+                        <a:spcBef>
+                          <a:spcPct val="35000"/>
+                        </a:spcBef>
+                        <a:spcAft>
+                          <a:spcPct val="0"/>
+                        </a:spcAft>
+                        <a:buClrTx/>
+                        <a:buSzTx/>
+                        <a:buFontTx/>
+                        <a:buNone/>
+                        <a:tabLst/>
+                      </a:pPr>
+                      <a:r>
+                        <a:rPr kumimoji="0" lang="en-US" sz="1400" b="0" i="0" u="none" strike="noStrike" cap="none" normalizeH="0" baseline="0" dirty="0">
                           <a:ln>
                             <a:noFill/>
                           </a:ln>
@@ -12086,9 +12408,9 @@
                       <a:headEnd type="none" w="med" len="med"/>
                       <a:tailEnd type="none" w="med" len="med"/>
                     </a:lnR>
-                    <a:lnT w="28575" cap="flat" cmpd="sng" algn="ctr">
-                      <a:solidFill>
-                        <a:scrgbClr r="0" g="0" b="0"/>
+                    <a:lnT w="12700" cap="flat" cmpd="sng" algn="ctr">
+                      <a:solidFill>
+                        <a:schemeClr val="tx1"/>
                       </a:solidFill>
                       <a:prstDash val="solid"/>
                       <a:round/>
@@ -12317,7 +12639,7 @@
                         <a:tabLst/>
                       </a:pPr>
                       <a:r>
-                        <a:rPr kumimoji="0" lang="en-US" sz="1400" b="0" i="0" u="none" strike="noStrike" cap="none" normalizeH="0" baseline="0" smtClean="0">
+                        <a:rPr kumimoji="0" lang="en-US" sz="1400" b="0" i="0" u="none" strike="noStrike" cap="none" normalizeH="0" baseline="0" dirty="0" smtClean="0">
                           <a:ln>
                             <a:noFill/>
                           </a:ln>
@@ -12331,7 +12653,7 @@
                         </a:rPr>
                         <a:t>Maximum number of individual subscription messages on the subscription pipe.</a:t>
                       </a:r>
-                      <a:endParaRPr kumimoji="0" lang="en-US" sz="1400" b="0" i="0" u="none" strike="noStrike" cap="none" normalizeH="0" baseline="0">
+                      <a:endParaRPr kumimoji="0" lang="en-US" sz="1400" b="0" i="0" u="none" strike="noStrike" cap="none" normalizeH="0" baseline="0" dirty="0">
                         <a:ln>
                           <a:noFill/>
                         </a:ln>
@@ -12681,7 +13003,7 @@
                         <a:tabLst/>
                       </a:pPr>
                       <a:r>
-                        <a:rPr kumimoji="0" lang="en-US" sz="1400" b="0" i="0" u="none" strike="noStrike" cap="none" normalizeH="0" baseline="0">
+                        <a:rPr kumimoji="0" lang="en-US" sz="1400" b="0" i="0" u="none" strike="noStrike" cap="none" normalizeH="0" baseline="0" dirty="0" err="1">
                           <a:ln>
                             <a:noFill/>
                           </a:ln>
@@ -12693,7 +13015,22 @@
                           <a:ea typeface="ヒラギノ角ゴ Pro W3" pitchFamily="-112" charset="-128"/>
                           <a:cs typeface="ヒラギノ角ゴ Pro W3" pitchFamily="-112" charset="-128"/>
                         </a:rPr>
-                        <a:t>int MAX_INTERFACE_TYPES</a:t>
+                        <a:t>int</a:t>
+                      </a:r>
+                      <a:r>
+                        <a:rPr kumimoji="0" lang="en-US" sz="1400" b="0" i="0" u="none" strike="noStrike" cap="none" normalizeH="0" baseline="0" dirty="0">
+                          <a:ln>
+                            <a:noFill/>
+                          </a:ln>
+                          <a:solidFill>
+                            <a:schemeClr val="tx1"/>
+                          </a:solidFill>
+                          <a:effectLst/>
+                          <a:latin typeface="Arial" pitchFamily="-112" charset="0"/>
+                          <a:ea typeface="ヒラギノ角ゴ Pro W3" pitchFamily="-112" charset="-128"/>
+                          <a:cs typeface="ヒラギノ角ゴ Pro W3" pitchFamily="-112" charset="-128"/>
+                        </a:rPr>
+                        <a:t> MAX_INTERFACE_TYPES</a:t>
                       </a:r>
                     </a:p>
                   </a:txBody>
@@ -13189,7 +13526,7 @@
                         <a:tabLst/>
                       </a:pPr>
                       <a:r>
-                        <a:rPr kumimoji="0" lang="en-US" sz="1400" b="0" i="0" u="none" strike="noStrike" cap="none" normalizeH="0" baseline="0">
+                        <a:rPr kumimoji="0" lang="en-US" sz="1400" b="0" i="0" u="none" strike="noStrike" cap="none" normalizeH="0" baseline="0" dirty="0" err="1">
                           <a:ln>
                             <a:noFill/>
                           </a:ln>
@@ -13201,8 +13538,50 @@
                           <a:ea typeface="ヒラギノ角ゴ Pro W3" pitchFamily="-112" charset="-128"/>
                           <a:cs typeface="ヒラギノ角ゴ Pro W3" pitchFamily="-112" charset="-128"/>
                         </a:rPr>
-                        <a:t>int STATUS_MSG_SIZE</a:t>
+                        <a:t>int</a:t>
                       </a:r>
+                      <a:r>
+                        <a:rPr kumimoji="0" lang="en-US" sz="1400" b="0" i="0" u="none" strike="noStrike" cap="none" normalizeH="0" baseline="0" dirty="0">
+                          <a:ln>
+                            <a:noFill/>
+                          </a:ln>
+                          <a:solidFill>
+                            <a:schemeClr val="tx1"/>
+                          </a:solidFill>
+                          <a:effectLst/>
+                          <a:latin typeface="Arial" pitchFamily="-112" charset="0"/>
+                          <a:ea typeface="ヒラギノ角ゴ Pro W3" pitchFamily="-112" charset="-128"/>
+                          <a:cs typeface="ヒラギノ角ゴ Pro W3" pitchFamily="-112" charset="-128"/>
+                        </a:rPr>
+                        <a:t> </a:t>
+                      </a:r>
+                      <a:r>
+                        <a:rPr kumimoji="0" lang="en-US" sz="1400" b="0" i="0" u="none" strike="noStrike" cap="none" normalizeH="0" baseline="0" dirty="0" smtClean="0">
+                          <a:ln>
+                            <a:noFill/>
+                          </a:ln>
+                          <a:solidFill>
+                            <a:schemeClr val="tx1"/>
+                          </a:solidFill>
+                          <a:effectLst/>
+                          <a:latin typeface="Arial" pitchFamily="-112" charset="0"/>
+                          <a:ea typeface="ヒラギノ角ゴ Pro W3" pitchFamily="-112" charset="-128"/>
+                          <a:cs typeface="ヒラギノ角ゴ Pro W3" pitchFamily="-112" charset="-128"/>
+                        </a:rPr>
+                        <a:t>MOD_STATUS_MSG_SIZE</a:t>
+                      </a:r>
+                      <a:endParaRPr kumimoji="0" lang="en-US" sz="1400" b="0" i="0" u="none" strike="noStrike" cap="none" normalizeH="0" baseline="0" dirty="0">
+                        <a:ln>
+                          <a:noFill/>
+                        </a:ln>
+                        <a:solidFill>
+                          <a:schemeClr val="tx1"/>
+                        </a:solidFill>
+                        <a:effectLst/>
+                        <a:latin typeface="Arial" pitchFamily="-112" charset="0"/>
+                        <a:ea typeface="ヒラギノ角ゴ Pro W3" pitchFamily="-112" charset="-128"/>
+                        <a:cs typeface="ヒラギノ角ゴ Pro W3" pitchFamily="-112" charset="-128"/>
+                      </a:endParaRPr>
                     </a:p>
                   </a:txBody>
                   <a:tcPr marT="45692" marB="45692" horzOverflow="overflow">
@@ -13443,7 +13822,7 @@
                         <a:tabLst/>
                       </a:pPr>
                       <a:r>
-                        <a:rPr kumimoji="0" lang="en-US" sz="1400" b="0" i="0" u="none" strike="noStrike" cap="none" normalizeH="0" baseline="0">
+                        <a:rPr kumimoji="0" lang="en-US" sz="1400" b="0" i="0" u="none" strike="noStrike" cap="none" normalizeH="0" baseline="0" dirty="0" err="1">
                           <a:ln>
                             <a:noFill/>
                           </a:ln>
@@ -13455,7 +13834,22 @@
                           <a:ea typeface="ヒラギノ角ゴ Pro W3" pitchFamily="-112" charset="-128"/>
                           <a:cs typeface="ヒラギノ角ゴ Pro W3" pitchFamily="-112" charset="-128"/>
                         </a:rPr>
-                        <a:t>boolean DEBUG_MSGS</a:t>
+                        <a:t>boolean</a:t>
+                      </a:r>
+                      <a:r>
+                        <a:rPr kumimoji="0" lang="en-US" sz="1400" b="0" i="0" u="none" strike="noStrike" cap="none" normalizeH="0" baseline="0" dirty="0">
+                          <a:ln>
+                            <a:noFill/>
+                          </a:ln>
+                          <a:solidFill>
+                            <a:schemeClr val="tx1"/>
+                          </a:solidFill>
+                          <a:effectLst/>
+                          <a:latin typeface="Arial" pitchFamily="-112" charset="0"/>
+                          <a:ea typeface="ヒラギノ角ゴ Pro W3" pitchFamily="-112" charset="-128"/>
+                          <a:cs typeface="ヒラギノ角ゴ Pro W3" pitchFamily="-112" charset="-128"/>
+                        </a:rPr>
+                        <a:t> DEBUG_MSGS</a:t>
                       </a:r>
                     </a:p>
                   </a:txBody>
@@ -13611,7 +14005,7 @@
                         <a:tabLst/>
                       </a:pPr>
                       <a:r>
-                        <a:rPr kumimoji="0" lang="en-US" sz="1400" b="0" i="0" u="none" strike="noStrike" cap="none" normalizeH="0" baseline="0">
+                        <a:rPr kumimoji="0" lang="en-US" sz="1400" b="0" i="0" u="none" strike="noStrike" cap="none" normalizeH="0" baseline="0" dirty="0">
                           <a:ln>
                             <a:noFill/>
                           </a:ln>
@@ -13777,14 +14171,14 @@
           <a:ln/>
           <a:extLst>
             <a:ext uri="{909E8E84-426E-40dd-AFC4-6F175D3DCCD1}">
-              <a14:hiddenFill xmlns:a14="http://schemas.microsoft.com/office/drawing/2010/main" xmlns="">
+              <a14:hiddenFill xmlns="" xmlns:a14="http://schemas.microsoft.com/office/drawing/2010/main">
                 <a:solidFill>
                   <a:srgbClr val="FFFFFF"/>
                 </a:solidFill>
               </a14:hiddenFill>
             </a:ext>
             <a:ext uri="{91240B29-F687-4f45-9708-019B960494DF}">
-              <a14:hiddenLine xmlns:a14="http://schemas.microsoft.com/office/drawing/2010/main" xmlns="" w="9525">
+              <a14:hiddenLine xmlns="" xmlns:a14="http://schemas.microsoft.com/office/drawing/2010/main" w="9525">
                 <a:solidFill>
                   <a:srgbClr val="000000"/>
                 </a:solidFill>
@@ -16047,14 +16441,14 @@
           <a:ln/>
           <a:extLst>
             <a:ext uri="{909E8E84-426E-40dd-AFC4-6F175D3DCCD1}">
-              <a14:hiddenFill xmlns:a14="http://schemas.microsoft.com/office/drawing/2010/main" xmlns="">
+              <a14:hiddenFill xmlns="" xmlns:a14="http://schemas.microsoft.com/office/drawing/2010/main">
                 <a:solidFill>
                   <a:srgbClr val="FFFFFF"/>
                 </a:solidFill>
               </a14:hiddenFill>
             </a:ext>
             <a:ext uri="{91240B29-F687-4f45-9708-019B960494DF}">
-              <a14:hiddenLine xmlns:a14="http://schemas.microsoft.com/office/drawing/2010/main" xmlns="" w="9525">
+              <a14:hiddenLine xmlns="" xmlns:a14="http://schemas.microsoft.com/office/drawing/2010/main" w="9525">
                 <a:solidFill>
                   <a:srgbClr val="000000"/>
                 </a:solidFill>
@@ -18791,14 +19185,14 @@
           </a:ln>
           <a:extLst>
             <a:ext uri="{909E8E84-426E-40dd-AFC4-6F175D3DCCD1}">
-              <a14:hiddenFill xmlns:a14="http://schemas.microsoft.com/office/drawing/2010/main" xmlns="">
+              <a14:hiddenFill xmlns="" xmlns:a14="http://schemas.microsoft.com/office/drawing/2010/main">
                 <a:solidFill>
                   <a:srgbClr val="FFFFFF"/>
                 </a:solidFill>
               </a14:hiddenFill>
             </a:ext>
             <a:ext uri="{91240B29-F687-4f45-9708-019B960494DF}">
-              <a14:hiddenLine xmlns:a14="http://schemas.microsoft.com/office/drawing/2010/main" xmlns="" w="9525">
+              <a14:hiddenLine xmlns="" xmlns:a14="http://schemas.microsoft.com/office/drawing/2010/main" w="9525">
                 <a:solidFill>
                   <a:srgbClr val="000000"/>
                 </a:solidFill>
@@ -18983,14 +19377,14 @@
           </a:ln>
           <a:extLst>
             <a:ext uri="{909E8E84-426E-40dd-AFC4-6F175D3DCCD1}">
-              <a14:hiddenFill xmlns:a14="http://schemas.microsoft.com/office/drawing/2010/main" xmlns="">
+              <a14:hiddenFill xmlns="" xmlns:a14="http://schemas.microsoft.com/office/drawing/2010/main">
                 <a:solidFill>
                   <a:srgbClr val="FFFFFF"/>
                 </a:solidFill>
               </a14:hiddenFill>
             </a:ext>
             <a:ext uri="{91240B29-F687-4f45-9708-019B960494DF}">
-              <a14:hiddenLine xmlns:a14="http://schemas.microsoft.com/office/drawing/2010/main" xmlns="" w="9525">
+              <a14:hiddenLine xmlns="" xmlns:a14="http://schemas.microsoft.com/office/drawing/2010/main" w="9525">
                 <a:solidFill>
                   <a:srgbClr val="000000"/>
                 </a:solidFill>
@@ -19172,7 +19566,7 @@
         </p:nvGraphicFramePr>
         <p:xfrm>
           <a:off x="595313" y="1411288"/>
-          <a:ext cx="7693025" cy="3046503"/>
+          <a:ext cx="7693025" cy="3046504"/>
         </p:xfrm>
         <a:graphic>
           <a:graphicData uri="http://schemas.openxmlformats.org/drawingml/2006/table">
@@ -22036,14 +22430,14 @@
           </a:ln>
           <a:extLst>
             <a:ext uri="{909E8E84-426E-40dd-AFC4-6F175D3DCCD1}">
-              <a14:hiddenFill xmlns:a14="http://schemas.microsoft.com/office/drawing/2010/main" xmlns="">
+              <a14:hiddenFill xmlns="" xmlns:a14="http://schemas.microsoft.com/office/drawing/2010/main">
                 <a:solidFill>
                   <a:srgbClr val="FFFFFF"/>
                 </a:solidFill>
               </a14:hiddenFill>
             </a:ext>
             <a:ext uri="{91240B29-F687-4f45-9708-019B960494DF}">
-              <a14:hiddenLine xmlns:a14="http://schemas.microsoft.com/office/drawing/2010/main" xmlns="" w="9525">
+              <a14:hiddenLine xmlns="" xmlns:a14="http://schemas.microsoft.com/office/drawing/2010/main" w="9525">
                 <a:solidFill>
                   <a:srgbClr val="000000"/>
                 </a:solidFill>
@@ -22248,14 +22642,14 @@
           <a:ln/>
           <a:extLst>
             <a:ext uri="{909E8E84-426E-40dd-AFC4-6F175D3DCCD1}">
-              <a14:hiddenFill xmlns:a14="http://schemas.microsoft.com/office/drawing/2010/main" xmlns="">
+              <a14:hiddenFill xmlns="" xmlns:a14="http://schemas.microsoft.com/office/drawing/2010/main">
                 <a:solidFill>
                   <a:srgbClr val="FFFFFF"/>
                 </a:solidFill>
               </a14:hiddenFill>
             </a:ext>
             <a:ext uri="{91240B29-F687-4f45-9708-019B960494DF}">
-              <a14:hiddenLine xmlns:a14="http://schemas.microsoft.com/office/drawing/2010/main" xmlns="" w="9525">
+              <a14:hiddenLine xmlns="" xmlns:a14="http://schemas.microsoft.com/office/drawing/2010/main" w="9525">
                 <a:solidFill>
                   <a:srgbClr val="000000"/>
                 </a:solidFill>
@@ -22442,14 +22836,14 @@
           </a:ln>
           <a:extLst>
             <a:ext uri="{909E8E84-426E-40dd-AFC4-6F175D3DCCD1}">
-              <a14:hiddenFill xmlns:a14="http://schemas.microsoft.com/office/drawing/2010/main" xmlns="">
+              <a14:hiddenFill xmlns="" xmlns:a14="http://schemas.microsoft.com/office/drawing/2010/main">
                 <a:solidFill>
                   <a:srgbClr val="FFFFFF"/>
                 </a:solidFill>
               </a14:hiddenFill>
             </a:ext>
             <a:ext uri="{91240B29-F687-4f45-9708-019B960494DF}">
-              <a14:hiddenLine xmlns:a14="http://schemas.microsoft.com/office/drawing/2010/main" xmlns="" w="9525">
+              <a14:hiddenLine xmlns="" xmlns:a14="http://schemas.microsoft.com/office/drawing/2010/main" w="9525">
                 <a:solidFill>
                   <a:srgbClr val="000000"/>
                 </a:solidFill>
@@ -22680,14 +23074,14 @@
           <a:ln/>
           <a:extLst>
             <a:ext uri="{909E8E84-426E-40dd-AFC4-6F175D3DCCD1}">
-              <a14:hiddenFill xmlns:a14="http://schemas.microsoft.com/office/drawing/2010/main" xmlns="">
+              <a14:hiddenFill xmlns="" xmlns:a14="http://schemas.microsoft.com/office/drawing/2010/main">
                 <a:solidFill>
                   <a:srgbClr val="FFFFFF"/>
                 </a:solidFill>
               </a14:hiddenFill>
             </a:ext>
             <a:ext uri="{91240B29-F687-4f45-9708-019B960494DF}">
-              <a14:hiddenLine xmlns:a14="http://schemas.microsoft.com/office/drawing/2010/main" xmlns="" w="9525">
+              <a14:hiddenLine xmlns="" xmlns:a14="http://schemas.microsoft.com/office/drawing/2010/main" w="9525">
                 <a:solidFill>
                   <a:srgbClr val="000000"/>
                 </a:solidFill>
@@ -27433,14 +27827,14 @@
           </a:ln>
           <a:extLst>
             <a:ext uri="{909E8E84-426E-40dd-AFC4-6F175D3DCCD1}">
-              <a14:hiddenFill xmlns:a14="http://schemas.microsoft.com/office/drawing/2010/main" xmlns="">
+              <a14:hiddenFill xmlns="" xmlns:a14="http://schemas.microsoft.com/office/drawing/2010/main">
                 <a:solidFill>
                   <a:srgbClr val="FFFFFF"/>
                 </a:solidFill>
               </a14:hiddenFill>
             </a:ext>
             <a:ext uri="{91240B29-F687-4f45-9708-019B960494DF}">
-              <a14:hiddenLine xmlns:a14="http://schemas.microsoft.com/office/drawing/2010/main" xmlns="" w="9525">
+              <a14:hiddenLine xmlns="" xmlns:a14="http://schemas.microsoft.com/office/drawing/2010/main" w="9525">
                 <a:solidFill>
                   <a:srgbClr val="000000"/>
                 </a:solidFill>
@@ -29202,14 +29596,14 @@
           </a:ln>
           <a:extLst>
             <a:ext uri="{909E8E84-426E-40dd-AFC4-6F175D3DCCD1}">
-              <a14:hiddenFill xmlns:a14="http://schemas.microsoft.com/office/drawing/2010/main" xmlns="">
+              <a14:hiddenFill xmlns="" xmlns:a14="http://schemas.microsoft.com/office/drawing/2010/main">
                 <a:solidFill>
                   <a:srgbClr val="FFFFFF"/>
                 </a:solidFill>
               </a14:hiddenFill>
             </a:ext>
             <a:ext uri="{91240B29-F687-4f45-9708-019B960494DF}">
-              <a14:hiddenLine xmlns:a14="http://schemas.microsoft.com/office/drawing/2010/main" xmlns="" w="9525">
+              <a14:hiddenLine xmlns="" xmlns:a14="http://schemas.microsoft.com/office/drawing/2010/main" w="9525">
                 <a:solidFill>
                   <a:srgbClr val="000000"/>
                 </a:solidFill>
@@ -29414,14 +29808,14 @@
           <a:ln/>
           <a:extLst>
             <a:ext uri="{909E8E84-426E-40dd-AFC4-6F175D3DCCD1}">
-              <a14:hiddenFill xmlns:a14="http://schemas.microsoft.com/office/drawing/2010/main" xmlns="">
+              <a14:hiddenFill xmlns="" xmlns:a14="http://schemas.microsoft.com/office/drawing/2010/main">
                 <a:solidFill>
                   <a:srgbClr val="FFFFFF"/>
                 </a:solidFill>
               </a14:hiddenFill>
             </a:ext>
             <a:ext uri="{91240B29-F687-4f45-9708-019B960494DF}">
-              <a14:hiddenLine xmlns:a14="http://schemas.microsoft.com/office/drawing/2010/main" xmlns="" w="9525">
+              <a14:hiddenLine xmlns="" xmlns:a14="http://schemas.microsoft.com/office/drawing/2010/main" w="9525">
                 <a:solidFill>
                   <a:srgbClr val="000000"/>
                 </a:solidFill>
@@ -29606,14 +30000,14 @@
           <a:ln/>
           <a:extLst>
             <a:ext uri="{909E8E84-426E-40dd-AFC4-6F175D3DCCD1}">
-              <a14:hiddenFill xmlns:a14="http://schemas.microsoft.com/office/drawing/2010/main" xmlns="">
+              <a14:hiddenFill xmlns="" xmlns:a14="http://schemas.microsoft.com/office/drawing/2010/main">
                 <a:solidFill>
                   <a:srgbClr val="FFFFFF"/>
                 </a:solidFill>
               </a14:hiddenFill>
             </a:ext>
             <a:ext uri="{91240B29-F687-4f45-9708-019B960494DF}">
-              <a14:hiddenLine xmlns:a14="http://schemas.microsoft.com/office/drawing/2010/main" xmlns="" w="9525">
+              <a14:hiddenLine xmlns="" xmlns:a14="http://schemas.microsoft.com/office/drawing/2010/main" w="9525">
                 <a:solidFill>
                   <a:srgbClr val="000000"/>
                 </a:solidFill>
@@ -31484,14 +31878,14 @@
           <a:ln/>
           <a:extLst>
             <a:ext uri="{909E8E84-426E-40dd-AFC4-6F175D3DCCD1}">
-              <a14:hiddenFill xmlns:a14="http://schemas.microsoft.com/office/drawing/2010/main" xmlns="">
+              <a14:hiddenFill xmlns="" xmlns:a14="http://schemas.microsoft.com/office/drawing/2010/main">
                 <a:solidFill>
                   <a:srgbClr val="FFFFFF"/>
                 </a:solidFill>
               </a14:hiddenFill>
             </a:ext>
             <a:ext uri="{91240B29-F687-4f45-9708-019B960494DF}">
-              <a14:hiddenLine xmlns:a14="http://schemas.microsoft.com/office/drawing/2010/main" xmlns="" w="9525">
+              <a14:hiddenLine xmlns="" xmlns:a14="http://schemas.microsoft.com/office/drawing/2010/main" w="9525">
                 <a:solidFill>
                   <a:srgbClr val="000000"/>
                 </a:solidFill>
@@ -31653,14 +32047,14 @@
           </a:ln>
           <a:extLst>
             <a:ext uri="{909E8E84-426E-40dd-AFC4-6F175D3DCCD1}">
-              <a14:hiddenFill xmlns:a14="http://schemas.microsoft.com/office/drawing/2010/main" xmlns="">
+              <a14:hiddenFill xmlns="" xmlns:a14="http://schemas.microsoft.com/office/drawing/2010/main">
                 <a:solidFill>
                   <a:srgbClr val="FFFFFF"/>
                 </a:solidFill>
               </a14:hiddenFill>
             </a:ext>
             <a:ext uri="{91240B29-F687-4f45-9708-019B960494DF}">
-              <a14:hiddenLine xmlns:a14="http://schemas.microsoft.com/office/drawing/2010/main" xmlns="" w="9525">
+              <a14:hiddenLine xmlns="" xmlns:a14="http://schemas.microsoft.com/office/drawing/2010/main" w="9525">
                 <a:solidFill>
                   <a:srgbClr val="000000"/>
                 </a:solidFill>
@@ -31716,14 +32110,14 @@
           </a:ln>
           <a:extLst>
             <a:ext uri="{909E8E84-426E-40dd-AFC4-6F175D3DCCD1}">
-              <a14:hiddenFill xmlns:a14="http://schemas.microsoft.com/office/drawing/2010/main" xmlns="">
+              <a14:hiddenFill xmlns="" xmlns:a14="http://schemas.microsoft.com/office/drawing/2010/main">
                 <a:solidFill>
                   <a:srgbClr val="FFFFFF"/>
                 </a:solidFill>
               </a14:hiddenFill>
             </a:ext>
             <a:ext uri="{91240B29-F687-4f45-9708-019B960494DF}">
-              <a14:hiddenLine xmlns:a14="http://schemas.microsoft.com/office/drawing/2010/main" xmlns="" w="9525">
+              <a14:hiddenLine xmlns="" xmlns:a14="http://schemas.microsoft.com/office/drawing/2010/main" w="9525">
                 <a:solidFill>
                   <a:srgbClr val="000000"/>
                 </a:solidFill>
@@ -32076,14 +32470,14 @@
           <a:ln/>
           <a:extLst>
             <a:ext uri="{909E8E84-426E-40dd-AFC4-6F175D3DCCD1}">
-              <a14:hiddenFill xmlns:a14="http://schemas.microsoft.com/office/drawing/2010/main" xmlns="">
+              <a14:hiddenFill xmlns="" xmlns:a14="http://schemas.microsoft.com/office/drawing/2010/main">
                 <a:solidFill>
                   <a:srgbClr val="FFFFFF"/>
                 </a:solidFill>
               </a14:hiddenFill>
             </a:ext>
             <a:ext uri="{91240B29-F687-4f45-9708-019B960494DF}">
-              <a14:hiddenLine xmlns:a14="http://schemas.microsoft.com/office/drawing/2010/main" xmlns="" w="9525">
+              <a14:hiddenLine xmlns="" xmlns:a14="http://schemas.microsoft.com/office/drawing/2010/main" w="9525">
                 <a:solidFill>
                   <a:srgbClr val="000000"/>
                 </a:solidFill>
@@ -32245,14 +32639,14 @@
           </a:ln>
           <a:extLst>
             <a:ext uri="{909E8E84-426E-40dd-AFC4-6F175D3DCCD1}">
-              <a14:hiddenFill xmlns:a14="http://schemas.microsoft.com/office/drawing/2010/main" xmlns="">
+              <a14:hiddenFill xmlns="" xmlns:a14="http://schemas.microsoft.com/office/drawing/2010/main">
                 <a:solidFill>
                   <a:srgbClr val="FFFFFF"/>
                 </a:solidFill>
               </a14:hiddenFill>
             </a:ext>
             <a:ext uri="{91240B29-F687-4f45-9708-019B960494DF}">
-              <a14:hiddenLine xmlns:a14="http://schemas.microsoft.com/office/drawing/2010/main" xmlns="" w="9525">
+              <a14:hiddenLine xmlns="" xmlns:a14="http://schemas.microsoft.com/office/drawing/2010/main" w="9525">
                 <a:solidFill>
                   <a:srgbClr val="000000"/>
                 </a:solidFill>
@@ -32308,14 +32702,14 @@
           </a:ln>
           <a:extLst>
             <a:ext uri="{909E8E84-426E-40dd-AFC4-6F175D3DCCD1}">
-              <a14:hiddenFill xmlns:a14="http://schemas.microsoft.com/office/drawing/2010/main" xmlns="">
+              <a14:hiddenFill xmlns="" xmlns:a14="http://schemas.microsoft.com/office/drawing/2010/main">
                 <a:solidFill>
                   <a:srgbClr val="FFFFFF"/>
                 </a:solidFill>
               </a14:hiddenFill>
             </a:ext>
             <a:ext uri="{91240B29-F687-4f45-9708-019B960494DF}">
-              <a14:hiddenLine xmlns:a14="http://schemas.microsoft.com/office/drawing/2010/main" xmlns="" w="9525">
+              <a14:hiddenLine xmlns="" xmlns:a14="http://schemas.microsoft.com/office/drawing/2010/main" w="9525">
                 <a:solidFill>
                   <a:srgbClr val="000000"/>
                 </a:solidFill>
@@ -32705,14 +33099,14 @@
           <a:ln/>
           <a:extLst>
             <a:ext uri="{909E8E84-426E-40dd-AFC4-6F175D3DCCD1}">
-              <a14:hiddenFill xmlns:a14="http://schemas.microsoft.com/office/drawing/2010/main" xmlns="">
+              <a14:hiddenFill xmlns="" xmlns:a14="http://schemas.microsoft.com/office/drawing/2010/main">
                 <a:solidFill>
                   <a:srgbClr val="FFFFFF"/>
                 </a:solidFill>
               </a14:hiddenFill>
             </a:ext>
             <a:ext uri="{91240B29-F687-4f45-9708-019B960494DF}">
-              <a14:hiddenLine xmlns:a14="http://schemas.microsoft.com/office/drawing/2010/main" xmlns="" w="9525">
+              <a14:hiddenLine xmlns="" xmlns:a14="http://schemas.microsoft.com/office/drawing/2010/main" w="9525">
                 <a:solidFill>
                   <a:srgbClr val="000000"/>
                 </a:solidFill>
@@ -32874,14 +33268,14 @@
           </a:ln>
           <a:extLst>
             <a:ext uri="{909E8E84-426E-40dd-AFC4-6F175D3DCCD1}">
-              <a14:hiddenFill xmlns:a14="http://schemas.microsoft.com/office/drawing/2010/main" xmlns="">
+              <a14:hiddenFill xmlns="" xmlns:a14="http://schemas.microsoft.com/office/drawing/2010/main">
                 <a:solidFill>
                   <a:srgbClr val="FFFFFF"/>
                 </a:solidFill>
               </a14:hiddenFill>
             </a:ext>
             <a:ext uri="{91240B29-F687-4f45-9708-019B960494DF}">
-              <a14:hiddenLine xmlns:a14="http://schemas.microsoft.com/office/drawing/2010/main" xmlns="" w="9525">
+              <a14:hiddenLine xmlns="" xmlns:a14="http://schemas.microsoft.com/office/drawing/2010/main" w="9525">
                 <a:solidFill>
                   <a:srgbClr val="000000"/>
                 </a:solidFill>
@@ -33976,14 +34370,14 @@
           </a:ln>
           <a:extLst>
             <a:ext uri="{909E8E84-426E-40dd-AFC4-6F175D3DCCD1}">
-              <a14:hiddenFill xmlns:a14="http://schemas.microsoft.com/office/drawing/2010/main" xmlns="">
+              <a14:hiddenFill xmlns="" xmlns:a14="http://schemas.microsoft.com/office/drawing/2010/main">
                 <a:solidFill>
                   <a:srgbClr val="FFFFFF"/>
                 </a:solidFill>
               </a14:hiddenFill>
             </a:ext>
             <a:ext uri="{91240B29-F687-4f45-9708-019B960494DF}">
-              <a14:hiddenLine xmlns:a14="http://schemas.microsoft.com/office/drawing/2010/main" xmlns="" w="9525">
+              <a14:hiddenLine xmlns="" xmlns:a14="http://schemas.microsoft.com/office/drawing/2010/main" w="9525">
                 <a:solidFill>
                   <a:srgbClr val="000000"/>
                 </a:solidFill>
@@ -34176,7 +34570,7 @@
           </a:ln>
           <a:extLst>
             <a:ext uri="{909E8E84-426E-40dd-AFC4-6F175D3DCCD1}">
-              <a14:hiddenFill xmlns:a14="http://schemas.microsoft.com/office/drawing/2010/main" xmlns="">
+              <a14:hiddenFill xmlns="" xmlns:a14="http://schemas.microsoft.com/office/drawing/2010/main">
                 <a:noFill/>
               </a14:hiddenFill>
             </a:ext>
@@ -34453,14 +34847,14 @@
           <a:ln/>
           <a:extLst>
             <a:ext uri="{909E8E84-426E-40dd-AFC4-6F175D3DCCD1}">
-              <a14:hiddenFill xmlns:a14="http://schemas.microsoft.com/office/drawing/2010/main" xmlns="">
+              <a14:hiddenFill xmlns="" xmlns:a14="http://schemas.microsoft.com/office/drawing/2010/main">
                 <a:solidFill>
                   <a:srgbClr val="FFFFFF"/>
                 </a:solidFill>
               </a14:hiddenFill>
             </a:ext>
             <a:ext uri="{91240B29-F687-4f45-9708-019B960494DF}">
-              <a14:hiddenLine xmlns:a14="http://schemas.microsoft.com/office/drawing/2010/main" xmlns="" w="9525">
+              <a14:hiddenLine xmlns="" xmlns:a14="http://schemas.microsoft.com/office/drawing/2010/main" w="9525">
                 <a:solidFill>
                   <a:srgbClr val="000000"/>
                 </a:solidFill>
@@ -35965,14 +36359,14 @@
           <a:ln/>
           <a:extLst>
             <a:ext uri="{909E8E84-426E-40dd-AFC4-6F175D3DCCD1}">
-              <a14:hiddenFill xmlns:a14="http://schemas.microsoft.com/office/drawing/2010/main" xmlns="">
+              <a14:hiddenFill xmlns="" xmlns:a14="http://schemas.microsoft.com/office/drawing/2010/main">
                 <a:solidFill>
                   <a:srgbClr val="FFFFFF"/>
                 </a:solidFill>
               </a14:hiddenFill>
             </a:ext>
             <a:ext uri="{91240B29-F687-4f45-9708-019B960494DF}">
-              <a14:hiddenLine xmlns:a14="http://schemas.microsoft.com/office/drawing/2010/main" xmlns="" w="9525">
+              <a14:hiddenLine xmlns="" xmlns:a14="http://schemas.microsoft.com/office/drawing/2010/main" w="9525">
                 <a:solidFill>
                   <a:srgbClr val="000000"/>
                 </a:solidFill>
@@ -38262,14 +38656,14 @@
           <a:ln/>
           <a:extLst>
             <a:ext uri="{909E8E84-426E-40dd-AFC4-6F175D3DCCD1}">
-              <a14:hiddenFill xmlns:a14="http://schemas.microsoft.com/office/drawing/2010/main" xmlns="">
+              <a14:hiddenFill xmlns="" xmlns:a14="http://schemas.microsoft.com/office/drawing/2010/main">
                 <a:solidFill>
                   <a:srgbClr val="FFFFFF"/>
                 </a:solidFill>
               </a14:hiddenFill>
             </a:ext>
             <a:ext uri="{91240B29-F687-4f45-9708-019B960494DF}">
-              <a14:hiddenLine xmlns:a14="http://schemas.microsoft.com/office/drawing/2010/main" xmlns="" w="9525">
+              <a14:hiddenLine xmlns="" xmlns:a14="http://schemas.microsoft.com/office/drawing/2010/main" w="9525">
                 <a:solidFill>
                   <a:srgbClr val="000000"/>
                 </a:solidFill>
@@ -40343,14 +40737,14 @@
           <a:effectLst/>
           <a:extLst>
             <a:ext uri="{909E8E84-426E-40dd-AFC4-6F175D3DCCD1}">
-              <a14:hiddenFill xmlns:a14="http://schemas.microsoft.com/office/drawing/2010/main" xmlns="">
+              <a14:hiddenFill xmlns="" xmlns:a14="http://schemas.microsoft.com/office/drawing/2010/main">
                 <a:solidFill>
                   <a:srgbClr val="FFFFFF"/>
                 </a:solidFill>
               </a14:hiddenFill>
             </a:ext>
             <a:ext uri="{91240B29-F687-4f45-9708-019B960494DF}">
-              <a14:hiddenLine xmlns:a14="http://schemas.microsoft.com/office/drawing/2010/main" xmlns="" w="9525">
+              <a14:hiddenLine xmlns="" xmlns:a14="http://schemas.microsoft.com/office/drawing/2010/main" w="9525">
                 <a:solidFill>
                   <a:srgbClr val="000000"/>
                 </a:solidFill>
@@ -41682,14 +42076,14 @@
           <a:ln/>
           <a:extLst>
             <a:ext uri="{909E8E84-426E-40dd-AFC4-6F175D3DCCD1}">
-              <a14:hiddenFill xmlns:a14="http://schemas.microsoft.com/office/drawing/2010/main" xmlns="">
+              <a14:hiddenFill xmlns="" xmlns:a14="http://schemas.microsoft.com/office/drawing/2010/main">
                 <a:solidFill>
                   <a:srgbClr val="FFFFFF"/>
                 </a:solidFill>
               </a14:hiddenFill>
             </a:ext>
             <a:ext uri="{91240B29-F687-4f45-9708-019B960494DF}">
-              <a14:hiddenLine xmlns:a14="http://schemas.microsoft.com/office/drawing/2010/main" xmlns="" w="9525">
+              <a14:hiddenLine xmlns="" xmlns:a14="http://schemas.microsoft.com/office/drawing/2010/main" w="9525">
                 <a:solidFill>
                   <a:srgbClr val="000000"/>
                 </a:solidFill>

</xml_diff>